<commit_message>
Update 8. Graph Attention Networks.pptx
</commit_message>
<xml_diff>
--- a/8. Graph Attention Networks.pptx
+++ b/8. Graph Attention Networks.pptx
@@ -926,6 +926,30 @@
               <a:rPr lang="en-US" dirty="0"/>
               <a:t>Multi-head attention helps to stabilize the learning process</a:t>
             </a:r>
+          </a:p>
+          <a:p>
+            <a:endParaRPr lang="en-US" dirty="0"/>
+          </a:p>
+          <a:p>
+            <a:r>
+              <a:rPr lang="en-US" dirty="0"/>
+              <a:t>The position encoding is </a:t>
+            </a:r>
+            <a:r>
+              <a:rPr lang="en-US" dirty="0">
+                <a:effectLst/>
+              </a:rPr>
+              <a:t>d</a:t>
+            </a:r>
+            <a:r>
+              <a:rPr lang="en-US" dirty="0"/>
+              <a:t>-dimensional vector containing the information about a specific position in a sentence. Additionally, because this encoding is not integrated into the model itself, this vector is used to equip each word with information about its position in a sentence</a:t>
+            </a:r>
+            <a:r>
+              <a:rPr lang="en-US"/>
+              <a:t>. </a:t>
+            </a:r>
+            <a:endParaRPr lang="en-US" dirty="0"/>
           </a:p>
         </p:txBody>
       </p:sp>
@@ -14314,8 +14338,8 @@
           </a:fontRef>
         </p:style>
       </p:cxnSp>
-      <mc:AlternateContent xmlns:mc="http://schemas.openxmlformats.org/markup-compatibility/2006">
-        <mc:Choice xmlns:a14="http://schemas.microsoft.com/office/drawing/2010/main" Requires="a14">
+      <mc:AlternateContent xmlns:mc="http://schemas.openxmlformats.org/markup-compatibility/2006" xmlns:a14="http://schemas.microsoft.com/office/drawing/2010/main">
+        <mc:Choice Requires="a14">
           <p:sp>
             <p:nvSpPr>
               <p:cNvPr id="116" name="TextBox 115">
@@ -14364,6 +14388,7 @@
                 </a:r>
               </a:p>
               <a:p>
+                <a:pPr/>
                 <a14:m>
                   <m:oMathPara xmlns:m="http://schemas.openxmlformats.org/officeDocument/2006/math">
                     <m:oMathParaPr>
@@ -14536,7 +14561,7 @@
             </p:txBody>
           </p:sp>
         </mc:Choice>
-        <mc:Fallback>
+        <mc:Fallback xmlns="">
           <p:sp>
             <p:nvSpPr>
               <p:cNvPr id="116" name="TextBox 115">
@@ -15350,8 +15375,8 @@
           </a:p>
         </p:txBody>
       </p:sp>
-      <mc:AlternateContent xmlns:mc="http://schemas.openxmlformats.org/markup-compatibility/2006">
-        <mc:Choice xmlns:a14="http://schemas.microsoft.com/office/drawing/2010/main" Requires="a14">
+      <mc:AlternateContent xmlns:mc="http://schemas.openxmlformats.org/markup-compatibility/2006" xmlns:a14="http://schemas.microsoft.com/office/drawing/2010/main">
+        <mc:Choice Requires="a14">
           <p:sp>
             <p:nvSpPr>
               <p:cNvPr id="137" name="TextBox 136">
@@ -15491,7 +15516,7 @@
             </p:txBody>
           </p:sp>
         </mc:Choice>
-        <mc:Fallback>
+        <mc:Fallback xmlns="">
           <p:sp>
             <p:nvSpPr>
               <p:cNvPr id="137" name="TextBox 136">
@@ -17191,8 +17216,8 @@
           </a:p>
         </p:txBody>
       </p:sp>
-      <mc:AlternateContent xmlns:mc="http://schemas.openxmlformats.org/markup-compatibility/2006">
-        <mc:Choice xmlns:a14="http://schemas.microsoft.com/office/drawing/2010/main" Requires="a14">
+      <mc:AlternateContent xmlns:mc="http://schemas.openxmlformats.org/markup-compatibility/2006" xmlns:a14="http://schemas.microsoft.com/office/drawing/2010/main">
+        <mc:Choice Requires="a14">
           <p:sp>
             <p:nvSpPr>
               <p:cNvPr id="3" name="Content Placeholder 2">
@@ -17554,7 +17579,7 @@
             </p:txBody>
           </p:sp>
         </mc:Choice>
-        <mc:Fallback>
+        <mc:Fallback xmlns="">
           <p:sp>
             <p:nvSpPr>
               <p:cNvPr id="3" name="Content Placeholder 2">
@@ -17896,8 +17921,8 @@
           </a:p>
         </p:txBody>
       </p:sp>
-      <mc:AlternateContent xmlns:mc="http://schemas.openxmlformats.org/markup-compatibility/2006">
-        <mc:Choice xmlns:a14="http://schemas.microsoft.com/office/drawing/2010/main" Requires="a14">
+      <mc:AlternateContent xmlns:mc="http://schemas.openxmlformats.org/markup-compatibility/2006" xmlns:a14="http://schemas.microsoft.com/office/drawing/2010/main">
+        <mc:Choice Requires="a14">
           <p:sp>
             <p:nvSpPr>
               <p:cNvPr id="11" name="TextBox 10">
@@ -18027,7 +18052,7 @@
             </p:txBody>
           </p:sp>
         </mc:Choice>
-        <mc:Fallback>
+        <mc:Fallback xmlns="">
           <p:sp>
             <p:nvSpPr>
               <p:cNvPr id="11" name="TextBox 10">
@@ -18283,8 +18308,8 @@
           </a:p>
         </p:txBody>
       </p:sp>
-      <mc:AlternateContent xmlns:mc="http://schemas.openxmlformats.org/markup-compatibility/2006">
-        <mc:Choice xmlns:a14="http://schemas.microsoft.com/office/drawing/2010/main" Requires="a14">
+      <mc:AlternateContent xmlns:mc="http://schemas.openxmlformats.org/markup-compatibility/2006" xmlns:a14="http://schemas.microsoft.com/office/drawing/2010/main">
+        <mc:Choice Requires="a14">
           <p:sp>
             <p:nvSpPr>
               <p:cNvPr id="11" name="TextBox 10">
@@ -18414,7 +18439,7 @@
             </p:txBody>
           </p:sp>
         </mc:Choice>
-        <mc:Fallback>
+        <mc:Fallback xmlns="">
           <p:sp>
             <p:nvSpPr>
               <p:cNvPr id="11" name="TextBox 10">
@@ -18579,8 +18604,8 @@
           </a:prstGeom>
         </p:spPr>
       </p:pic>
-      <mc:AlternateContent xmlns:mc="http://schemas.openxmlformats.org/markup-compatibility/2006">
-        <mc:Choice xmlns:a14="http://schemas.microsoft.com/office/drawing/2010/main" Requires="a14">
+      <mc:AlternateContent xmlns:mc="http://schemas.openxmlformats.org/markup-compatibility/2006" xmlns:a14="http://schemas.microsoft.com/office/drawing/2010/main">
+        <mc:Choice Requires="a14">
           <p:sp>
             <p:nvSpPr>
               <p:cNvPr id="22" name="TextBox 21">
@@ -18721,7 +18746,7 @@
             </p:txBody>
           </p:sp>
         </mc:Choice>
-        <mc:Fallback>
+        <mc:Fallback xmlns="">
           <p:sp>
             <p:nvSpPr>
               <p:cNvPr id="22" name="TextBox 21">
@@ -18766,8 +18791,8 @@
           </p:sp>
         </mc:Fallback>
       </mc:AlternateContent>
-      <mc:AlternateContent xmlns:mc="http://schemas.openxmlformats.org/markup-compatibility/2006">
-        <mc:Choice xmlns:a14="http://schemas.microsoft.com/office/drawing/2010/main" Requires="a14">
+      <mc:AlternateContent xmlns:mc="http://schemas.openxmlformats.org/markup-compatibility/2006" xmlns:a14="http://schemas.microsoft.com/office/drawing/2010/main">
+        <mc:Choice Requires="a14">
           <p:sp>
             <p:nvSpPr>
               <p:cNvPr id="24" name="TextBox 23">
@@ -18849,7 +18874,7 @@
             </p:txBody>
           </p:sp>
         </mc:Choice>
-        <mc:Fallback>
+        <mc:Fallback xmlns="">
           <p:sp>
             <p:nvSpPr>
               <p:cNvPr id="24" name="TextBox 23">
@@ -20883,7 +20908,7 @@
         </p:nvSpPr>
         <p:spPr bwMode="gray">
           <a:xfrm>
-            <a:off x="7554054" y="3280396"/>
+            <a:off x="7497741" y="3214387"/>
             <a:ext cx="3911486" cy="2785579"/>
           </a:xfrm>
           <a:prstGeom prst="roundRect">
@@ -21085,7 +21110,7 @@
             </a:r>
             <a:r>
               <a:rPr lang="en-US" sz="1600" dirty="0"/>
-              <a:t>captures the sequence of the input (e.g., words, as they matter to the translation task)</a:t>
+              <a:t>captures the sequence of the input. It uses a sin and cosine to have a continuous encoding [2]</a:t>
             </a:r>
           </a:p>
         </p:txBody>
@@ -21375,7 +21400,7 @@
         </p:nvSpPr>
         <p:spPr bwMode="gray">
           <a:xfrm>
-            <a:off x="6231973" y="6347560"/>
+            <a:off x="7147255" y="6313268"/>
             <a:ext cx="4318285" cy="523220"/>
           </a:xfrm>
           <a:prstGeom prst="rect">
@@ -21410,8 +21435,8 @@
         </p:nvSpPr>
         <p:spPr bwMode="gray">
           <a:xfrm>
-            <a:off x="94456" y="6566263"/>
-            <a:ext cx="5572325" cy="276999"/>
+            <a:off x="0" y="6406789"/>
+            <a:ext cx="6907013" cy="461665"/>
           </a:xfrm>
           <a:prstGeom prst="rect">
             <a:avLst/>
@@ -21426,7 +21451,20 @@
           <a:p>
             <a:r>
               <a:rPr lang="en-US" sz="1200" dirty="0"/>
-              <a:t>[1] http://jalammar.github.io/images/t/transformer_decoding_2.gif</a:t>
+              <a:t>[1]</a:t>
+            </a:r>
+            <a:r>
+              <a:rPr lang="en-US" sz="1200" dirty="0">
+                <a:hlinkClick r:id="rId6"/>
+              </a:rPr>
+              <a:t>http://jalammar.github.io/images/t/transformer_decoding_2.gif</a:t>
+            </a:r>
+            <a:endParaRPr lang="en-US" sz="1200" dirty="0"/>
+          </a:p>
+          <a:p>
+            <a:r>
+              <a:rPr lang="en-US" sz="1200" dirty="0"/>
+              <a:t>[2]https://kazemnejad.com/blog/transformer_architecture_positional_encoding/    </a:t>
             </a:r>
           </a:p>
         </p:txBody>
@@ -21449,8 +21487,8 @@
         </p:nvCxnSpPr>
         <p:spPr bwMode="gray">
           <a:xfrm>
-            <a:off x="6644640" y="6150614"/>
-            <a:ext cx="1746476" cy="196946"/>
+            <a:off x="6705509" y="6082778"/>
+            <a:ext cx="2600889" cy="230490"/>
           </a:xfrm>
           <a:prstGeom prst="bentConnector2">
             <a:avLst/>
@@ -21491,7 +21529,7 @@
         </p:nvSpPr>
         <p:spPr bwMode="gray">
           <a:xfrm>
-            <a:off x="6548846" y="6065975"/>
+            <a:off x="6609715" y="5998139"/>
             <a:ext cx="95794" cy="169277"/>
           </a:xfrm>
           <a:prstGeom prst="rect">
@@ -27518,8 +27556,8 @@
           </a:p>
         </p:txBody>
       </p:sp>
-      <mc:AlternateContent xmlns:mc="http://schemas.openxmlformats.org/markup-compatibility/2006">
-        <mc:Choice xmlns:a14="http://schemas.microsoft.com/office/drawing/2010/main" Requires="a14">
+      <mc:AlternateContent xmlns:mc="http://schemas.openxmlformats.org/markup-compatibility/2006" xmlns:a14="http://schemas.microsoft.com/office/drawing/2010/main">
+        <mc:Choice Requires="a14">
           <p:sp>
             <p:nvSpPr>
               <p:cNvPr id="3" name="Content Placeholder 2">
@@ -27670,7 +27708,7 @@
             </p:txBody>
           </p:sp>
         </mc:Choice>
-        <mc:Fallback>
+        <mc:Fallback xmlns="">
           <p:sp>
             <p:nvSpPr>
               <p:cNvPr id="3" name="Content Placeholder 2">
@@ -27743,8 +27781,8 @@
           </a:p>
         </p:txBody>
       </p:sp>
-      <mc:AlternateContent xmlns:mc="http://schemas.openxmlformats.org/markup-compatibility/2006">
-        <mc:Choice xmlns:a14="http://schemas.microsoft.com/office/drawing/2010/main" Requires="a14">
+      <mc:AlternateContent xmlns:mc="http://schemas.openxmlformats.org/markup-compatibility/2006" xmlns:a14="http://schemas.microsoft.com/office/drawing/2010/main">
+        <mc:Choice Requires="a14">
           <p:sp>
             <p:nvSpPr>
               <p:cNvPr id="5" name="TextBox 4">
@@ -28073,7 +28111,7 @@
             </p:txBody>
           </p:sp>
         </mc:Choice>
-        <mc:Fallback>
+        <mc:Fallback xmlns="">
           <p:sp>
             <p:nvSpPr>
               <p:cNvPr id="5" name="TextBox 4">
@@ -28362,8 +28400,8 @@
           </a:p>
         </p:txBody>
       </p:sp>
-      <mc:AlternateContent xmlns:mc="http://schemas.openxmlformats.org/markup-compatibility/2006">
-        <mc:Choice xmlns:a14="http://schemas.microsoft.com/office/drawing/2010/main" Requires="a14">
+      <mc:AlternateContent xmlns:mc="http://schemas.openxmlformats.org/markup-compatibility/2006" xmlns:a14="http://schemas.microsoft.com/office/drawing/2010/main">
+        <mc:Choice Requires="a14">
           <p:sp>
             <p:nvSpPr>
               <p:cNvPr id="10" name="TextBox 9">
@@ -28451,7 +28489,7 @@
             </p:txBody>
           </p:sp>
         </mc:Choice>
-        <mc:Fallback>
+        <mc:Fallback xmlns="">
           <p:sp>
             <p:nvSpPr>
               <p:cNvPr id="10" name="TextBox 9">
@@ -28496,8 +28534,8 @@
           </p:sp>
         </mc:Fallback>
       </mc:AlternateContent>
-      <mc:AlternateContent xmlns:mc="http://schemas.openxmlformats.org/markup-compatibility/2006">
-        <mc:Choice xmlns:a14="http://schemas.microsoft.com/office/drawing/2010/main" Requires="a14">
+      <mc:AlternateContent xmlns:mc="http://schemas.openxmlformats.org/markup-compatibility/2006" xmlns:a14="http://schemas.microsoft.com/office/drawing/2010/main">
+        <mc:Choice Requires="a14">
           <p:sp>
             <p:nvSpPr>
               <p:cNvPr id="11" name="TextBox 10">
@@ -28566,7 +28604,7 @@
             </p:txBody>
           </p:sp>
         </mc:Choice>
-        <mc:Fallback>
+        <mc:Fallback xmlns="">
           <p:sp>
             <p:nvSpPr>
               <p:cNvPr id="11" name="TextBox 10">
@@ -28611,8 +28649,8 @@
           </p:sp>
         </mc:Fallback>
       </mc:AlternateContent>
-      <mc:AlternateContent xmlns:mc="http://schemas.openxmlformats.org/markup-compatibility/2006">
-        <mc:Choice xmlns:a14="http://schemas.microsoft.com/office/drawing/2010/main" Requires="a14">
+      <mc:AlternateContent xmlns:mc="http://schemas.openxmlformats.org/markup-compatibility/2006" xmlns:a14="http://schemas.microsoft.com/office/drawing/2010/main">
+        <mc:Choice Requires="a14">
           <p:sp>
             <p:nvSpPr>
               <p:cNvPr id="12" name="TextBox 11">
@@ -28712,7 +28750,7 @@
             </p:txBody>
           </p:sp>
         </mc:Choice>
-        <mc:Fallback>
+        <mc:Fallback xmlns="">
           <p:sp>
             <p:nvSpPr>
               <p:cNvPr id="12" name="TextBox 11">

</xml_diff>